<commit_message>
refined slides + detailed docs of slides can be used for presentation
</commit_message>
<xml_diff>
--- a/mid-term-pre/presentation_slides.pptx
+++ b/mid-term-pre/presentation_slides.pptx
@@ -361,7 +361,7 @@
           <a:p>
             <a:fld id="{9184DA70-C731-4C70-880D-CCD4705E623C}" type="datetime1">
               <a:rPr lang="en-US" smtClean="0"/>
-              <a:t>3/27/2021</a:t>
+              <a:t>3/28/2021</a:t>
             </a:fld>
             <a:endParaRPr lang="en-US" dirty="0"/>
           </a:p>
@@ -549,7 +549,7 @@
           <a:p>
             <a:fld id="{B612A279-0833-481D-8C56-F67FD0AC6C50}" type="datetime1">
               <a:rPr lang="en-US" smtClean="0"/>
-              <a:t>3/27/2021</a:t>
+              <a:t>3/28/2021</a:t>
             </a:fld>
             <a:endParaRPr lang="en-US" dirty="0"/>
           </a:p>
@@ -791,7 +791,7 @@
           <a:p>
             <a:fld id="{6587DA83-5663-4C9C-B9AA-0B40A3DAFF81}" type="datetime1">
               <a:rPr lang="en-US" smtClean="0"/>
-              <a:t>3/27/2021</a:t>
+              <a:t>3/28/2021</a:t>
             </a:fld>
             <a:endParaRPr lang="en-US" dirty="0"/>
           </a:p>
@@ -979,7 +979,7 @@
           <a:p>
             <a:fld id="{4BE1D723-8F53-4F53-90B0-1982A396982E}" type="datetime1">
               <a:rPr lang="en-US" smtClean="0"/>
-              <a:t>3/27/2021</a:t>
+              <a:t>3/28/2021</a:t>
             </a:fld>
             <a:endParaRPr lang="en-US" dirty="0"/>
           </a:p>
@@ -1352,7 +1352,7 @@
           <a:p>
             <a:fld id="{97669AF7-7BEB-44E4-9852-375E34362B5B}" type="datetime1">
               <a:rPr lang="en-US" smtClean="0"/>
-              <a:t>3/27/2021</a:t>
+              <a:t>3/28/2021</a:t>
             </a:fld>
             <a:endParaRPr lang="en-US" dirty="0"/>
           </a:p>
@@ -1607,7 +1607,7 @@
           <a:p>
             <a:fld id="{BAAAC38D-0552-4C82-B593-E6124DFADBE2}" type="datetime1">
               <a:rPr lang="en-US" smtClean="0"/>
-              <a:t>3/27/2021</a:t>
+              <a:t>3/28/2021</a:t>
             </a:fld>
             <a:endParaRPr lang="en-US" dirty="0"/>
           </a:p>
@@ -2004,7 +2004,7 @@
           <a:p>
             <a:fld id="{D9DF0F1C-5577-4ACB-BB62-DF8F3C494C7E}" type="datetime1">
               <a:rPr lang="en-US" smtClean="0"/>
-              <a:t>3/27/2021</a:t>
+              <a:t>3/28/2021</a:t>
             </a:fld>
             <a:endParaRPr lang="en-US" dirty="0"/>
           </a:p>
@@ -2140,7 +2140,7 @@
           <a:p>
             <a:fld id="{1775B394-D9F9-4F0C-B15D-605F45CB9E9F}" type="datetime1">
               <a:rPr lang="en-US" smtClean="0"/>
-              <a:t>3/27/2021</a:t>
+              <a:t>3/28/2021</a:t>
             </a:fld>
             <a:endParaRPr lang="en-US" dirty="0"/>
           </a:p>
@@ -2297,7 +2297,7 @@
           <a:p>
             <a:fld id="{39667345-2558-425A-8533-9BFDBCE15005}" type="datetime1">
               <a:rPr lang="en-US" smtClean="0"/>
-              <a:t>3/27/2021</a:t>
+              <a:t>3/28/2021</a:t>
             </a:fld>
             <a:endParaRPr lang="en-US" dirty="0"/>
           </a:p>
@@ -2626,7 +2626,7 @@
           <a:p>
             <a:fld id="{92BEA474-078D-4E9B-9B14-09A87B19DC46}" type="datetime1">
               <a:rPr lang="en-US" smtClean="0"/>
-              <a:t>3/27/2021</a:t>
+              <a:t>3/28/2021</a:t>
             </a:fld>
             <a:endParaRPr lang="en-US" dirty="0"/>
           </a:p>
@@ -2976,7 +2976,7 @@
           <a:p>
             <a:fld id="{4907D986-8816-4272-A432-0437A28A9828}" type="datetime1">
               <a:rPr lang="en-US" smtClean="0"/>
-              <a:t>3/27/2021</a:t>
+              <a:t>3/28/2021</a:t>
             </a:fld>
             <a:endParaRPr lang="en-US" dirty="0"/>
           </a:p>
@@ -3237,7 +3237,7 @@
           <a:p>
             <a:fld id="{62D6E202-B606-4609-B914-27C9371A1F6D}" type="datetime1">
               <a:rPr lang="en-US" smtClean="0"/>
-              <a:t>3/27/2021</a:t>
+              <a:t>3/28/2021</a:t>
             </a:fld>
             <a:endParaRPr lang="en-US" dirty="0"/>
           </a:p>
@@ -4808,7 +4808,7 @@
           <a:lstStyle/>
           <a:p>
             <a:r>
-              <a:rPr lang="en-US" i="0" kern="1200" spc="-50" baseline="0">
+              <a:rPr lang="en-US" i="0" kern="1200" spc="-50" baseline="0" dirty="0">
                 <a:latin typeface="+mj-lt"/>
                 <a:ea typeface="+mj-ea"/>
                 <a:cs typeface="+mj-cs"/>
@@ -4832,7 +4832,7 @@
         </p:nvSpPr>
         <p:spPr>
           <a:xfrm>
-            <a:off x="1097280" y="2120900"/>
+            <a:off x="1031340" y="2120900"/>
             <a:ext cx="4639736" cy="3748193"/>
           </a:xfrm>
           <a:prstGeom prst="rect">
@@ -4860,7 +4860,7 @@
                   </a:schemeClr>
                 </a:solidFill>
               </a:rPr>
-              <a:t>The figure on the right shows the architecture of the entire tracing system. The client apps communicate with other client apps using UDP protocol. The privacy generating and sharing components are used for generating and sharing the ID of the client. </a:t>
+              <a:t>The figure on the right shows the architecture of the entire tracing system. The client apps communicate with other client apps using UDP protocol. The privacy generating and sharing components are used for generating and sharing the ID of the client.</a:t>
             </a:r>
           </a:p>
           <a:p>
@@ -4879,7 +4879,7 @@
                   </a:schemeClr>
                 </a:solidFill>
               </a:rPr>
-              <a:t>The privacy storage component handles the ID storage of those clients who had close contact with the current client. The data will be stored in a Bloom Filter data structure for easily uploading to or querying the server. </a:t>
+              <a:t>The privacy storage component handles the ID storage of those clients who had close contact with the current client. The data will be stored in a Bloom Filter data structure for easily uploading to or querying the server.</a:t>
             </a:r>
           </a:p>
           <a:p>

</xml_diff>